<commit_message>
Adds new results, makes changes to the paper, and creates d3 based scatter plot for the t-sne results
</commit_message>
<xml_diff>
--- a/Solution3/Results/Figures.pptx
+++ b/Solution3/Results/Figures.pptx
@@ -105,6 +105,11 @@
       </a:defRPr>
     </a:lvl9pPr>
   </p:defaultTextStyle>
+  <p:extLst>
+    <p:ext uri="{EFAFB233-063F-42B5-8137-9DF3F51BA10A}">
+      <p15:sldGuideLst xmlns:p15="http://schemas.microsoft.com/office/powerpoint/2012/main"/>
+    </p:ext>
+  </p:extLst>
 </p:presentation>
 </file>
 
@@ -255,7 +260,7 @@
           <a:p>
             <a:fld id="{885F2751-1FF6-4173-AF55-7D23BADA2D19}" type="datetimeFigureOut">
               <a:rPr lang="en-US" smtClean="0"/>
-              <a:t>7/12/2019</a:t>
+              <a:t>7/22/2019</a:t>
             </a:fld>
             <a:endParaRPr lang="en-US"/>
           </a:p>
@@ -453,7 +458,7 @@
           <a:p>
             <a:fld id="{885F2751-1FF6-4173-AF55-7D23BADA2D19}" type="datetimeFigureOut">
               <a:rPr lang="en-US" smtClean="0"/>
-              <a:t>7/12/2019</a:t>
+              <a:t>7/22/2019</a:t>
             </a:fld>
             <a:endParaRPr lang="en-US"/>
           </a:p>
@@ -661,7 +666,7 @@
           <a:p>
             <a:fld id="{885F2751-1FF6-4173-AF55-7D23BADA2D19}" type="datetimeFigureOut">
               <a:rPr lang="en-US" smtClean="0"/>
-              <a:t>7/12/2019</a:t>
+              <a:t>7/22/2019</a:t>
             </a:fld>
             <a:endParaRPr lang="en-US"/>
           </a:p>
@@ -859,7 +864,7 @@
           <a:p>
             <a:fld id="{885F2751-1FF6-4173-AF55-7D23BADA2D19}" type="datetimeFigureOut">
               <a:rPr lang="en-US" smtClean="0"/>
-              <a:t>7/12/2019</a:t>
+              <a:t>7/22/2019</a:t>
             </a:fld>
             <a:endParaRPr lang="en-US"/>
           </a:p>
@@ -1134,7 +1139,7 @@
           <a:p>
             <a:fld id="{885F2751-1FF6-4173-AF55-7D23BADA2D19}" type="datetimeFigureOut">
               <a:rPr lang="en-US" smtClean="0"/>
-              <a:t>7/12/2019</a:t>
+              <a:t>7/22/2019</a:t>
             </a:fld>
             <a:endParaRPr lang="en-US"/>
           </a:p>
@@ -1399,7 +1404,7 @@
           <a:p>
             <a:fld id="{885F2751-1FF6-4173-AF55-7D23BADA2D19}" type="datetimeFigureOut">
               <a:rPr lang="en-US" smtClean="0"/>
-              <a:t>7/12/2019</a:t>
+              <a:t>7/22/2019</a:t>
             </a:fld>
             <a:endParaRPr lang="en-US"/>
           </a:p>
@@ -1811,7 +1816,7 @@
           <a:p>
             <a:fld id="{885F2751-1FF6-4173-AF55-7D23BADA2D19}" type="datetimeFigureOut">
               <a:rPr lang="en-US" smtClean="0"/>
-              <a:t>7/12/2019</a:t>
+              <a:t>7/22/2019</a:t>
             </a:fld>
             <a:endParaRPr lang="en-US"/>
           </a:p>
@@ -1952,7 +1957,7 @@
           <a:p>
             <a:fld id="{885F2751-1FF6-4173-AF55-7D23BADA2D19}" type="datetimeFigureOut">
               <a:rPr lang="en-US" smtClean="0"/>
-              <a:t>7/12/2019</a:t>
+              <a:t>7/22/2019</a:t>
             </a:fld>
             <a:endParaRPr lang="en-US"/>
           </a:p>
@@ -2065,7 +2070,7 @@
           <a:p>
             <a:fld id="{885F2751-1FF6-4173-AF55-7D23BADA2D19}" type="datetimeFigureOut">
               <a:rPr lang="en-US" smtClean="0"/>
-              <a:t>7/12/2019</a:t>
+              <a:t>7/22/2019</a:t>
             </a:fld>
             <a:endParaRPr lang="en-US"/>
           </a:p>
@@ -2376,7 +2381,7 @@
           <a:p>
             <a:fld id="{885F2751-1FF6-4173-AF55-7D23BADA2D19}" type="datetimeFigureOut">
               <a:rPr lang="en-US" smtClean="0"/>
-              <a:t>7/12/2019</a:t>
+              <a:t>7/22/2019</a:t>
             </a:fld>
             <a:endParaRPr lang="en-US"/>
           </a:p>
@@ -2664,7 +2669,7 @@
           <a:p>
             <a:fld id="{885F2751-1FF6-4173-AF55-7D23BADA2D19}" type="datetimeFigureOut">
               <a:rPr lang="en-US" smtClean="0"/>
-              <a:t>7/12/2019</a:t>
+              <a:t>7/22/2019</a:t>
             </a:fld>
             <a:endParaRPr lang="en-US"/>
           </a:p>
@@ -2905,7 +2910,7 @@
           <a:p>
             <a:fld id="{885F2751-1FF6-4173-AF55-7D23BADA2D19}" type="datetimeFigureOut">
               <a:rPr lang="en-US" smtClean="0"/>
-              <a:t>7/12/2019</a:t>
+              <a:t>7/22/2019</a:t>
             </a:fld>
             <a:endParaRPr lang="en-US"/>
           </a:p>
@@ -3322,114 +3327,6 @@
           <a:chExt cx="0" cy="0"/>
         </a:xfrm>
       </p:grpSpPr>
-      <p:pic>
-        <p:nvPicPr>
-          <p:cNvPr id="5" name="Picture 4" descr="A close up of a map&#10;&#10;Description automatically generated">
-            <a:extLst>
-              <a:ext uri="{FF2B5EF4-FFF2-40B4-BE49-F238E27FC236}">
-                <a16:creationId xmlns:a16="http://schemas.microsoft.com/office/drawing/2014/main" id="{19499D23-39E9-4CDC-932F-DC62B8262560}"/>
-              </a:ext>
-            </a:extLst>
-          </p:cNvPr>
-          <p:cNvPicPr>
-            <a:picLocks noChangeAspect="1"/>
-          </p:cNvPicPr>
-          <p:nvPr/>
-        </p:nvPicPr>
-        <p:blipFill>
-          <a:blip r:embed="rId2">
-            <a:extLst>
-              <a:ext uri="{28A0092B-C50C-407E-A947-70E740481C1C}">
-                <a14:useLocalDpi xmlns:a14="http://schemas.microsoft.com/office/drawing/2010/main" val="0"/>
-              </a:ext>
-            </a:extLst>
-          </a:blip>
-          <a:stretch>
-            <a:fillRect/>
-          </a:stretch>
-        </p:blipFill>
-        <p:spPr>
-          <a:xfrm>
-            <a:off x="1662596" y="0"/>
-            <a:ext cx="4417390" cy="3313043"/>
-          </a:xfrm>
-          <a:prstGeom prst="rect">
-            <a:avLst/>
-          </a:prstGeom>
-        </p:spPr>
-      </p:pic>
-      <p:pic>
-        <p:nvPicPr>
-          <p:cNvPr id="7" name="Picture 6" descr="A close up of a map&#10;&#10;Description automatically generated">
-            <a:extLst>
-              <a:ext uri="{FF2B5EF4-FFF2-40B4-BE49-F238E27FC236}">
-                <a16:creationId xmlns:a16="http://schemas.microsoft.com/office/drawing/2014/main" id="{40B540F3-07CC-4A89-A5DE-BC981E725594}"/>
-              </a:ext>
-            </a:extLst>
-          </p:cNvPr>
-          <p:cNvPicPr>
-            <a:picLocks noChangeAspect="1"/>
-          </p:cNvPicPr>
-          <p:nvPr/>
-        </p:nvPicPr>
-        <p:blipFill>
-          <a:blip r:embed="rId3">
-            <a:extLst>
-              <a:ext uri="{28A0092B-C50C-407E-A947-70E740481C1C}">
-                <a14:useLocalDpi xmlns:a14="http://schemas.microsoft.com/office/drawing/2010/main" val="0"/>
-              </a:ext>
-            </a:extLst>
-          </a:blip>
-          <a:stretch>
-            <a:fillRect/>
-          </a:stretch>
-        </p:blipFill>
-        <p:spPr>
-          <a:xfrm>
-            <a:off x="6893891" y="0"/>
-            <a:ext cx="4417389" cy="3313042"/>
-          </a:xfrm>
-          <a:prstGeom prst="rect">
-            <a:avLst/>
-          </a:prstGeom>
-        </p:spPr>
-      </p:pic>
-      <p:pic>
-        <p:nvPicPr>
-          <p:cNvPr id="9" name="Picture 8" descr="A screenshot of a cell phone&#10;&#10;Description automatically generated">
-            <a:extLst>
-              <a:ext uri="{FF2B5EF4-FFF2-40B4-BE49-F238E27FC236}">
-                <a16:creationId xmlns:a16="http://schemas.microsoft.com/office/drawing/2014/main" id="{CDDF0595-9A3C-4EEC-91BF-27B5F970F55E}"/>
-              </a:ext>
-            </a:extLst>
-          </p:cNvPr>
-          <p:cNvPicPr>
-            <a:picLocks noChangeAspect="1"/>
-          </p:cNvPicPr>
-          <p:nvPr/>
-        </p:nvPicPr>
-        <p:blipFill>
-          <a:blip r:embed="rId4">
-            <a:extLst>
-              <a:ext uri="{28A0092B-C50C-407E-A947-70E740481C1C}">
-                <a14:useLocalDpi xmlns:a14="http://schemas.microsoft.com/office/drawing/2010/main" val="0"/>
-              </a:ext>
-            </a:extLst>
-          </a:blip>
-          <a:stretch>
-            <a:fillRect/>
-          </a:stretch>
-        </p:blipFill>
-        <p:spPr>
-          <a:xfrm>
-            <a:off x="6893890" y="3313042"/>
-            <a:ext cx="4417390" cy="3313042"/>
-          </a:xfrm>
-          <a:prstGeom prst="rect">
-            <a:avLst/>
-          </a:prstGeom>
-        </p:spPr>
-      </p:pic>
       <p:graphicFrame>
         <p:nvGraphicFramePr>
           <p:cNvPr id="11" name="Table 10">
@@ -3445,7 +3342,7 @@
           <p:nvPr>
             <p:extLst>
               <p:ext uri="{D42A27DB-BD31-4B8C-83A1-F6EECF244321}">
-                <p14:modId xmlns:p14="http://schemas.microsoft.com/office/powerpoint/2010/main" val="2609082995"/>
+                <p14:modId xmlns:p14="http://schemas.microsoft.com/office/powerpoint/2010/main" val="117697861"/>
               </p:ext>
             </p:extLst>
           </p:nvPr>
@@ -3680,18 +3577,15 @@
                     <a:p>
                       <a:pPr algn="r" fontAlgn="b"/>
                       <a:r>
-                        <a:rPr lang="en-US" sz="1100" u="none" strike="noStrike">
+                        <a:rPr lang="en-US" sz="1100" b="0" i="0" u="none" strike="noStrike">
+                          <a:solidFill>
+                            <a:srgbClr val="000000"/>
+                          </a:solidFill>
                           <a:effectLst/>
+                          <a:latin typeface="Calibri" panose="020F0502020204030204" pitchFamily="34" charset="0"/>
                         </a:rPr>
-                        <a:t>0.662650602</a:t>
+                        <a:t>0.614457831</a:t>
                       </a:r>
-                      <a:endParaRPr lang="en-US" sz="1100" b="0" i="0" u="none" strike="noStrike">
-                        <a:solidFill>
-                          <a:srgbClr val="000000"/>
-                        </a:solidFill>
-                        <a:effectLst/>
-                        <a:latin typeface="Calibri" panose="020F0502020204030204" pitchFamily="34" charset="0"/>
-                      </a:endParaRPr>
                     </a:p>
                   </a:txBody>
                   <a:tcPr marL="9525" marR="9525" marT="9525" marB="0" anchor="b"/>
@@ -3703,18 +3597,15 @@
                     <a:p>
                       <a:pPr algn="r" fontAlgn="b"/>
                       <a:r>
-                        <a:rPr lang="en-US" sz="1100" u="none" strike="noStrike" dirty="0">
+                        <a:rPr lang="en-US" sz="1100" b="0" i="0" u="none" strike="noStrike">
+                          <a:solidFill>
+                            <a:srgbClr val="000000"/>
+                          </a:solidFill>
                           <a:effectLst/>
+                          <a:latin typeface="Calibri" panose="020F0502020204030204" pitchFamily="34" charset="0"/>
                         </a:rPr>
-                        <a:t>0.69047619</a:t>
+                        <a:t>0.666666667</a:t>
                       </a:r>
-                      <a:endParaRPr lang="en-US" sz="1100" b="0" i="0" u="none" strike="noStrike" dirty="0">
-                        <a:solidFill>
-                          <a:srgbClr val="000000"/>
-                        </a:solidFill>
-                        <a:effectLst/>
-                        <a:latin typeface="Calibri" panose="020F0502020204030204" pitchFamily="34" charset="0"/>
-                      </a:endParaRPr>
                     </a:p>
                   </a:txBody>
                   <a:tcPr marL="9525" marR="9525" marT="9525" marB="0" anchor="b"/>
@@ -3726,18 +3617,15 @@
                     <a:p>
                       <a:pPr algn="r" fontAlgn="b"/>
                       <a:r>
-                        <a:rPr lang="en-US" sz="1100" u="none" strike="noStrike">
+                        <a:rPr lang="en-US" sz="1100" b="0" i="0" u="none" strike="noStrike" dirty="0">
+                          <a:solidFill>
+                            <a:srgbClr val="000000"/>
+                          </a:solidFill>
                           <a:effectLst/>
+                          <a:latin typeface="Calibri" panose="020F0502020204030204" pitchFamily="34" charset="0"/>
                         </a:rPr>
-                        <a:t>0.365853659</a:t>
+                        <a:t>0.439024390</a:t>
                       </a:r>
-                      <a:endParaRPr lang="en-US" sz="1100" b="0" i="0" u="none" strike="noStrike">
-                        <a:solidFill>
-                          <a:srgbClr val="000000"/>
-                        </a:solidFill>
-                        <a:effectLst/>
-                        <a:latin typeface="Calibri" panose="020F0502020204030204" pitchFamily="34" charset="0"/>
-                      </a:endParaRPr>
                     </a:p>
                   </a:txBody>
                   <a:tcPr marL="9525" marR="9525" marT="9525" marB="0" anchor="b"/>
@@ -3749,18 +3637,15 @@
                     <a:p>
                       <a:pPr algn="r" fontAlgn="b"/>
                       <a:r>
-                        <a:rPr lang="en-US" sz="1100" u="none" strike="noStrike">
+                        <a:rPr lang="en-US" sz="1100" b="0" i="0" u="none" strike="noStrike" dirty="0">
+                          <a:solidFill>
+                            <a:srgbClr val="000000"/>
+                          </a:solidFill>
                           <a:effectLst/>
+                          <a:latin typeface="Calibri" panose="020F0502020204030204" pitchFamily="34" charset="0"/>
                         </a:rPr>
-                        <a:t>0.782810685</a:t>
+                        <a:t>0.681184669</a:t>
                       </a:r>
-                      <a:endParaRPr lang="en-US" sz="1100" b="0" i="0" u="none" strike="noStrike">
-                        <a:solidFill>
-                          <a:srgbClr val="000000"/>
-                        </a:solidFill>
-                        <a:effectLst/>
-                        <a:latin typeface="Calibri" panose="020F0502020204030204" pitchFamily="34" charset="0"/>
-                      </a:endParaRPr>
                     </a:p>
                   </a:txBody>
                   <a:tcPr marL="9525" marR="9525" marT="9525" marB="0" anchor="b"/>
@@ -3848,12 +3733,12 @@
                     <a:p>
                       <a:pPr algn="r" fontAlgn="b"/>
                       <a:r>
-                        <a:rPr lang="en-US" sz="1100" u="none" strike="noStrike">
+                        <a:rPr lang="en-US" sz="1100" u="none" strike="noStrike" dirty="0">
                           <a:effectLst/>
                         </a:rPr>
-                        <a:t>0.69047619</a:t>
+                        <a:t>0.690476190</a:t>
                       </a:r>
-                      <a:endParaRPr lang="en-US" sz="1100" b="0" i="0" u="none" strike="noStrike">
+                      <a:endParaRPr lang="en-US" sz="1100" b="0" i="0" u="none" strike="noStrike" dirty="0">
                         <a:solidFill>
                           <a:srgbClr val="000000"/>
                         </a:solidFill>
@@ -3970,18 +3855,15 @@
                     <a:p>
                       <a:pPr algn="r" fontAlgn="b"/>
                       <a:r>
-                        <a:rPr lang="en-US" sz="1100" u="none" strike="noStrike">
+                        <a:rPr lang="en-US" sz="1100" b="0" i="0" u="none" strike="noStrike" dirty="0">
+                          <a:solidFill>
+                            <a:srgbClr val="000000"/>
+                          </a:solidFill>
                           <a:effectLst/>
+                          <a:latin typeface="Calibri" panose="020F0502020204030204" pitchFamily="34" charset="0"/>
                         </a:rPr>
-                        <a:t>0.86746988</a:t>
+                        <a:t>0.855421687</a:t>
                       </a:r>
-                      <a:endParaRPr lang="en-US" sz="1100" b="0" i="0" u="none" strike="noStrike">
-                        <a:solidFill>
-                          <a:srgbClr val="000000"/>
-                        </a:solidFill>
-                        <a:effectLst/>
-                        <a:latin typeface="Calibri" panose="020F0502020204030204" pitchFamily="34" charset="0"/>
-                      </a:endParaRPr>
                     </a:p>
                   </a:txBody>
                   <a:tcPr marL="9525" marR="9525" marT="9525" marB="0" anchor="b"/>
@@ -3993,18 +3875,15 @@
                     <a:p>
                       <a:pPr algn="r" fontAlgn="b"/>
                       <a:r>
-                        <a:rPr lang="en-US" sz="1100" u="none" strike="noStrike">
+                        <a:rPr lang="en-US" sz="1100" b="0" i="0" u="none" strike="noStrike" dirty="0">
+                          <a:solidFill>
+                            <a:srgbClr val="000000"/>
+                          </a:solidFill>
                           <a:effectLst/>
+                          <a:latin typeface="Calibri" panose="020F0502020204030204" pitchFamily="34" charset="0"/>
                         </a:rPr>
-                        <a:t>0.833333333</a:t>
+                        <a:t>0.857142857</a:t>
                       </a:r>
-                      <a:endParaRPr lang="en-US" sz="1100" b="0" i="0" u="none" strike="noStrike">
-                        <a:solidFill>
-                          <a:srgbClr val="000000"/>
-                        </a:solidFill>
-                        <a:effectLst/>
-                        <a:latin typeface="Calibri" panose="020F0502020204030204" pitchFamily="34" charset="0"/>
-                      </a:endParaRPr>
                     </a:p>
                   </a:txBody>
                   <a:tcPr marL="9525" marR="9525" marT="9525" marB="0" anchor="b"/>
@@ -4016,18 +3895,15 @@
                     <a:p>
                       <a:pPr algn="r" fontAlgn="b"/>
                       <a:r>
-                        <a:rPr lang="en-US" sz="1100" u="none" strike="noStrike" dirty="0">
+                        <a:rPr lang="en-US" sz="1100" b="0" i="0" u="none" strike="noStrike" dirty="0">
+                          <a:solidFill>
+                            <a:srgbClr val="000000"/>
+                          </a:solidFill>
                           <a:effectLst/>
+                          <a:latin typeface="Calibri" panose="020F0502020204030204" pitchFamily="34" charset="0"/>
                         </a:rPr>
-                        <a:t>0.097560976</a:t>
+                        <a:t>0.146341463</a:t>
                       </a:r>
-                      <a:endParaRPr lang="en-US" sz="1100" b="0" i="0" u="none" strike="noStrike" dirty="0">
-                        <a:solidFill>
-                          <a:srgbClr val="000000"/>
-                        </a:solidFill>
-                        <a:effectLst/>
-                        <a:latin typeface="Calibri" panose="020F0502020204030204" pitchFamily="34" charset="0"/>
-                      </a:endParaRPr>
                     </a:p>
                   </a:txBody>
                   <a:tcPr marL="9525" marR="9525" marT="9525" marB="0" anchor="b"/>
@@ -4039,18 +3915,15 @@
                     <a:p>
                       <a:pPr algn="r" fontAlgn="b"/>
                       <a:r>
-                        <a:rPr lang="en-US" sz="1100" u="none" strike="noStrike">
+                        <a:rPr lang="en-US" sz="1100" b="0" i="0" u="none" strike="noStrike" dirty="0">
+                          <a:solidFill>
+                            <a:srgbClr val="000000"/>
+                          </a:solidFill>
                           <a:effectLst/>
+                          <a:latin typeface="Calibri" panose="020F0502020204030204" pitchFamily="34" charset="0"/>
                         </a:rPr>
-                        <a:t>0.871660859</a:t>
+                        <a:t>0.898954704</a:t>
                       </a:r>
-                      <a:endParaRPr lang="en-US" sz="1100" b="0" i="0" u="none" strike="noStrike">
-                        <a:solidFill>
-                          <a:srgbClr val="000000"/>
-                        </a:solidFill>
-                        <a:effectLst/>
-                        <a:latin typeface="Calibri" panose="020F0502020204030204" pitchFamily="34" charset="0"/>
-                      </a:endParaRPr>
                     </a:p>
                   </a:txBody>
                   <a:tcPr marL="9525" marR="9525" marT="9525" marB="0" anchor="b"/>
@@ -4062,18 +3935,15 @@
                     <a:p>
                       <a:pPr algn="r" fontAlgn="b"/>
                       <a:r>
-                        <a:rPr lang="en-US" sz="1100" u="none" strike="noStrike" dirty="0">
+                        <a:rPr lang="en-US" sz="1100" b="0" i="0" u="none" strike="noStrike" dirty="0">
+                          <a:solidFill>
+                            <a:srgbClr val="000000"/>
+                          </a:solidFill>
                           <a:effectLst/>
+                          <a:latin typeface="Calibri" panose="020F0502020204030204" pitchFamily="34" charset="0"/>
                         </a:rPr>
-                        <a:t>0.042669754</a:t>
+                        <a:t>0.035593996</a:t>
                       </a:r>
-                      <a:endParaRPr lang="en-US" sz="1100" b="0" i="0" u="none" strike="noStrike" dirty="0">
-                        <a:solidFill>
-                          <a:srgbClr val="000000"/>
-                        </a:solidFill>
-                        <a:effectLst/>
-                        <a:latin typeface="Calibri" panose="020F0502020204030204" pitchFamily="34" charset="0"/>
-                      </a:endParaRPr>
                     </a:p>
                   </a:txBody>
                   <a:tcPr marL="9525" marR="9525" marT="9525" marB="0" anchor="b"/>
@@ -4228,6 +4098,114 @@
           </a:p>
         </p:txBody>
       </p:sp>
+      <p:pic>
+        <p:nvPicPr>
+          <p:cNvPr id="6" name="Picture 5">
+            <a:extLst>
+              <a:ext uri="{FF2B5EF4-FFF2-40B4-BE49-F238E27FC236}">
+                <a16:creationId xmlns:a16="http://schemas.microsoft.com/office/drawing/2014/main" id="{C1B83F80-FEF3-4AEC-AB6E-9485B73CC5A1}"/>
+              </a:ext>
+            </a:extLst>
+          </p:cNvPr>
+          <p:cNvPicPr>
+            <a:picLocks noChangeAspect="1"/>
+          </p:cNvPicPr>
+          <p:nvPr/>
+        </p:nvPicPr>
+        <p:blipFill>
+          <a:blip r:embed="rId2">
+            <a:extLst>
+              <a:ext uri="{28A0092B-C50C-407E-A947-70E740481C1C}">
+                <a14:useLocalDpi xmlns:a14="http://schemas.microsoft.com/office/drawing/2010/main" val="0"/>
+              </a:ext>
+            </a:extLst>
+          </a:blip>
+          <a:stretch>
+            <a:fillRect/>
+          </a:stretch>
+        </p:blipFill>
+        <p:spPr>
+          <a:xfrm>
+            <a:off x="1298554" y="115959"/>
+            <a:ext cx="4417388" cy="3313041"/>
+          </a:xfrm>
+          <a:prstGeom prst="rect">
+            <a:avLst/>
+          </a:prstGeom>
+        </p:spPr>
+      </p:pic>
+      <p:pic>
+        <p:nvPicPr>
+          <p:cNvPr id="10" name="Picture 9">
+            <a:extLst>
+              <a:ext uri="{FF2B5EF4-FFF2-40B4-BE49-F238E27FC236}">
+                <a16:creationId xmlns:a16="http://schemas.microsoft.com/office/drawing/2014/main" id="{BE579F8C-2BAC-4758-9DD2-949030CF31E5}"/>
+              </a:ext>
+            </a:extLst>
+          </p:cNvPr>
+          <p:cNvPicPr>
+            <a:picLocks noChangeAspect="1"/>
+          </p:cNvPicPr>
+          <p:nvPr/>
+        </p:nvPicPr>
+        <p:blipFill>
+          <a:blip r:embed="rId3">
+            <a:extLst>
+              <a:ext uri="{28A0092B-C50C-407E-A947-70E740481C1C}">
+                <a14:useLocalDpi xmlns:a14="http://schemas.microsoft.com/office/drawing/2010/main" val="0"/>
+              </a:ext>
+            </a:extLst>
+          </a:blip>
+          <a:stretch>
+            <a:fillRect/>
+          </a:stretch>
+        </p:blipFill>
+        <p:spPr>
+          <a:xfrm>
+            <a:off x="6890893" y="140013"/>
+            <a:ext cx="4385316" cy="3288987"/>
+          </a:xfrm>
+          <a:prstGeom prst="rect">
+            <a:avLst/>
+          </a:prstGeom>
+        </p:spPr>
+      </p:pic>
+      <p:pic>
+        <p:nvPicPr>
+          <p:cNvPr id="17" name="Picture 16">
+            <a:extLst>
+              <a:ext uri="{FF2B5EF4-FFF2-40B4-BE49-F238E27FC236}">
+                <a16:creationId xmlns:a16="http://schemas.microsoft.com/office/drawing/2014/main" id="{65E9D25D-1EC4-44D5-A295-59690F5DFD20}"/>
+              </a:ext>
+            </a:extLst>
+          </p:cNvPr>
+          <p:cNvPicPr>
+            <a:picLocks noChangeAspect="1"/>
+          </p:cNvPicPr>
+          <p:nvPr/>
+        </p:nvPicPr>
+        <p:blipFill>
+          <a:blip r:embed="rId4">
+            <a:extLst>
+              <a:ext uri="{28A0092B-C50C-407E-A947-70E740481C1C}">
+                <a14:useLocalDpi xmlns:a14="http://schemas.microsoft.com/office/drawing/2010/main" val="0"/>
+              </a:ext>
+            </a:extLst>
+          </a:blip>
+          <a:stretch>
+            <a:fillRect/>
+          </a:stretch>
+        </p:blipFill>
+        <p:spPr>
+          <a:xfrm>
+            <a:off x="6890893" y="3498537"/>
+            <a:ext cx="4385316" cy="3288987"/>
+          </a:xfrm>
+          <a:prstGeom prst="rect">
+            <a:avLst/>
+          </a:prstGeom>
+        </p:spPr>
+      </p:pic>
     </p:spTree>
     <p:extLst>
       <p:ext uri="{BB962C8B-B14F-4D97-AF65-F5344CB8AC3E}">

</xml_diff>

<commit_message>
Creates Unity app for cropping, finishes t-SNE for the web, updates some results/figures
</commit_message>
<xml_diff>
--- a/Solution3/Results/Figures.pptx
+++ b/Solution3/Results/Figures.pptx
@@ -260,7 +260,7 @@
           <a:p>
             <a:fld id="{885F2751-1FF6-4173-AF55-7D23BADA2D19}" type="datetimeFigureOut">
               <a:rPr lang="en-US" smtClean="0"/>
-              <a:t>7/22/2019</a:t>
+              <a:t>7/25/2019</a:t>
             </a:fld>
             <a:endParaRPr lang="en-US"/>
           </a:p>
@@ -458,7 +458,7 @@
           <a:p>
             <a:fld id="{885F2751-1FF6-4173-AF55-7D23BADA2D19}" type="datetimeFigureOut">
               <a:rPr lang="en-US" smtClean="0"/>
-              <a:t>7/22/2019</a:t>
+              <a:t>7/25/2019</a:t>
             </a:fld>
             <a:endParaRPr lang="en-US"/>
           </a:p>
@@ -666,7 +666,7 @@
           <a:p>
             <a:fld id="{885F2751-1FF6-4173-AF55-7D23BADA2D19}" type="datetimeFigureOut">
               <a:rPr lang="en-US" smtClean="0"/>
-              <a:t>7/22/2019</a:t>
+              <a:t>7/25/2019</a:t>
             </a:fld>
             <a:endParaRPr lang="en-US"/>
           </a:p>
@@ -864,7 +864,7 @@
           <a:p>
             <a:fld id="{885F2751-1FF6-4173-AF55-7D23BADA2D19}" type="datetimeFigureOut">
               <a:rPr lang="en-US" smtClean="0"/>
-              <a:t>7/22/2019</a:t>
+              <a:t>7/25/2019</a:t>
             </a:fld>
             <a:endParaRPr lang="en-US"/>
           </a:p>
@@ -1139,7 +1139,7 @@
           <a:p>
             <a:fld id="{885F2751-1FF6-4173-AF55-7D23BADA2D19}" type="datetimeFigureOut">
               <a:rPr lang="en-US" smtClean="0"/>
-              <a:t>7/22/2019</a:t>
+              <a:t>7/25/2019</a:t>
             </a:fld>
             <a:endParaRPr lang="en-US"/>
           </a:p>
@@ -1404,7 +1404,7 @@
           <a:p>
             <a:fld id="{885F2751-1FF6-4173-AF55-7D23BADA2D19}" type="datetimeFigureOut">
               <a:rPr lang="en-US" smtClean="0"/>
-              <a:t>7/22/2019</a:t>
+              <a:t>7/25/2019</a:t>
             </a:fld>
             <a:endParaRPr lang="en-US"/>
           </a:p>
@@ -1816,7 +1816,7 @@
           <a:p>
             <a:fld id="{885F2751-1FF6-4173-AF55-7D23BADA2D19}" type="datetimeFigureOut">
               <a:rPr lang="en-US" smtClean="0"/>
-              <a:t>7/22/2019</a:t>
+              <a:t>7/25/2019</a:t>
             </a:fld>
             <a:endParaRPr lang="en-US"/>
           </a:p>
@@ -1957,7 +1957,7 @@
           <a:p>
             <a:fld id="{885F2751-1FF6-4173-AF55-7D23BADA2D19}" type="datetimeFigureOut">
               <a:rPr lang="en-US" smtClean="0"/>
-              <a:t>7/22/2019</a:t>
+              <a:t>7/25/2019</a:t>
             </a:fld>
             <a:endParaRPr lang="en-US"/>
           </a:p>
@@ -2070,7 +2070,7 @@
           <a:p>
             <a:fld id="{885F2751-1FF6-4173-AF55-7D23BADA2D19}" type="datetimeFigureOut">
               <a:rPr lang="en-US" smtClean="0"/>
-              <a:t>7/22/2019</a:t>
+              <a:t>7/25/2019</a:t>
             </a:fld>
             <a:endParaRPr lang="en-US"/>
           </a:p>
@@ -2381,7 +2381,7 @@
           <a:p>
             <a:fld id="{885F2751-1FF6-4173-AF55-7D23BADA2D19}" type="datetimeFigureOut">
               <a:rPr lang="en-US" smtClean="0"/>
-              <a:t>7/22/2019</a:t>
+              <a:t>7/25/2019</a:t>
             </a:fld>
             <a:endParaRPr lang="en-US"/>
           </a:p>
@@ -2669,7 +2669,7 @@
           <a:p>
             <a:fld id="{885F2751-1FF6-4173-AF55-7D23BADA2D19}" type="datetimeFigureOut">
               <a:rPr lang="en-US" smtClean="0"/>
-              <a:t>7/22/2019</a:t>
+              <a:t>7/25/2019</a:t>
             </a:fld>
             <a:endParaRPr lang="en-US"/>
           </a:p>
@@ -2910,7 +2910,7 @@
           <a:p>
             <a:fld id="{885F2751-1FF6-4173-AF55-7D23BADA2D19}" type="datetimeFigureOut">
               <a:rPr lang="en-US" smtClean="0"/>
-              <a:t>7/22/2019</a:t>
+              <a:t>7/25/2019</a:t>
             </a:fld>
             <a:endParaRPr lang="en-US"/>
           </a:p>
@@ -3327,12 +3327,224 @@
           <a:chExt cx="0" cy="0"/>
         </a:xfrm>
       </p:grpSpPr>
+      <p:sp>
+        <p:nvSpPr>
+          <p:cNvPr id="13" name="TextBox 12">
+            <a:extLst>
+              <a:ext uri="{FF2B5EF4-FFF2-40B4-BE49-F238E27FC236}">
+                <a16:creationId xmlns:a16="http://schemas.microsoft.com/office/drawing/2014/main" id="{8916050D-2EE6-4348-A01B-64238411662B}"/>
+              </a:ext>
+            </a:extLst>
+          </p:cNvPr>
+          <p:cNvSpPr txBox="1"/>
+          <p:nvPr/>
+        </p:nvSpPr>
+        <p:spPr>
+          <a:xfrm>
+            <a:off x="880720" y="209550"/>
+            <a:ext cx="352982" cy="369332"/>
+          </a:xfrm>
+          <a:prstGeom prst="rect">
+            <a:avLst/>
+          </a:prstGeom>
+          <a:noFill/>
+        </p:spPr>
+        <p:txBody>
+          <a:bodyPr wrap="none" rtlCol="0">
+            <a:spAutoFit/>
+          </a:bodyPr>
+          <a:lstStyle/>
+          <a:p>
+            <a:r>
+              <a:rPr lang="en-US" dirty="0"/>
+              <a:t>a.</a:t>
+            </a:r>
+          </a:p>
+        </p:txBody>
+      </p:sp>
+      <p:sp>
+        <p:nvSpPr>
+          <p:cNvPr id="14" name="TextBox 13">
+            <a:extLst>
+              <a:ext uri="{FF2B5EF4-FFF2-40B4-BE49-F238E27FC236}">
+                <a16:creationId xmlns:a16="http://schemas.microsoft.com/office/drawing/2014/main" id="{09B1F528-A648-4AA1-873F-43E1DB8F4D18}"/>
+              </a:ext>
+            </a:extLst>
+          </p:cNvPr>
+          <p:cNvSpPr txBox="1"/>
+          <p:nvPr/>
+        </p:nvSpPr>
+        <p:spPr>
+          <a:xfrm>
+            <a:off x="6526691" y="209550"/>
+            <a:ext cx="364202" cy="369332"/>
+          </a:xfrm>
+          <a:prstGeom prst="rect">
+            <a:avLst/>
+          </a:prstGeom>
+          <a:noFill/>
+        </p:spPr>
+        <p:txBody>
+          <a:bodyPr wrap="none" rtlCol="0">
+            <a:spAutoFit/>
+          </a:bodyPr>
+          <a:lstStyle/>
+          <a:p>
+            <a:r>
+              <a:rPr lang="en-US" dirty="0"/>
+              <a:t>b.</a:t>
+            </a:r>
+          </a:p>
+        </p:txBody>
+      </p:sp>
+      <p:sp>
+        <p:nvSpPr>
+          <p:cNvPr id="15" name="TextBox 14">
+            <a:extLst>
+              <a:ext uri="{FF2B5EF4-FFF2-40B4-BE49-F238E27FC236}">
+                <a16:creationId xmlns:a16="http://schemas.microsoft.com/office/drawing/2014/main" id="{AD499430-AD49-46AF-A29C-52E35D97A3E0}"/>
+              </a:ext>
+            </a:extLst>
+          </p:cNvPr>
+          <p:cNvSpPr txBox="1"/>
+          <p:nvPr/>
+        </p:nvSpPr>
+        <p:spPr>
+          <a:xfrm>
+            <a:off x="880720" y="3429000"/>
+            <a:ext cx="340158" cy="369332"/>
+          </a:xfrm>
+          <a:prstGeom prst="rect">
+            <a:avLst/>
+          </a:prstGeom>
+          <a:noFill/>
+        </p:spPr>
+        <p:txBody>
+          <a:bodyPr wrap="none" rtlCol="0">
+            <a:spAutoFit/>
+          </a:bodyPr>
+          <a:lstStyle/>
+          <a:p>
+            <a:r>
+              <a:rPr lang="en-US" dirty="0"/>
+              <a:t>c.</a:t>
+            </a:r>
+          </a:p>
+        </p:txBody>
+      </p:sp>
+      <p:sp>
+        <p:nvSpPr>
+          <p:cNvPr id="16" name="TextBox 15">
+            <a:extLst>
+              <a:ext uri="{FF2B5EF4-FFF2-40B4-BE49-F238E27FC236}">
+                <a16:creationId xmlns:a16="http://schemas.microsoft.com/office/drawing/2014/main" id="{492C2DB8-ED5E-4E63-8F8B-020B5442011A}"/>
+              </a:ext>
+            </a:extLst>
+          </p:cNvPr>
+          <p:cNvSpPr txBox="1"/>
+          <p:nvPr/>
+        </p:nvSpPr>
+        <p:spPr>
+          <a:xfrm>
+            <a:off x="6540907" y="3429000"/>
+            <a:ext cx="364202" cy="369332"/>
+          </a:xfrm>
+          <a:prstGeom prst="rect">
+            <a:avLst/>
+          </a:prstGeom>
+          <a:noFill/>
+        </p:spPr>
+        <p:txBody>
+          <a:bodyPr wrap="none" rtlCol="0">
+            <a:spAutoFit/>
+          </a:bodyPr>
+          <a:lstStyle/>
+          <a:p>
+            <a:r>
+              <a:rPr lang="en-US" dirty="0"/>
+              <a:t>d.</a:t>
+            </a:r>
+          </a:p>
+        </p:txBody>
+      </p:sp>
+      <p:pic>
+        <p:nvPicPr>
+          <p:cNvPr id="6" name="Picture 5">
+            <a:extLst>
+              <a:ext uri="{FF2B5EF4-FFF2-40B4-BE49-F238E27FC236}">
+                <a16:creationId xmlns:a16="http://schemas.microsoft.com/office/drawing/2014/main" id="{C1B83F80-FEF3-4AEC-AB6E-9485B73CC5A1}"/>
+              </a:ext>
+            </a:extLst>
+          </p:cNvPr>
+          <p:cNvPicPr>
+            <a:picLocks noChangeAspect="1"/>
+          </p:cNvPicPr>
+          <p:nvPr/>
+        </p:nvPicPr>
+        <p:blipFill>
+          <a:blip r:embed="rId2">
+            <a:extLst>
+              <a:ext uri="{28A0092B-C50C-407E-A947-70E740481C1C}">
+                <a14:useLocalDpi xmlns:a14="http://schemas.microsoft.com/office/drawing/2010/main" val="0"/>
+              </a:ext>
+            </a:extLst>
+          </a:blip>
+          <a:stretch>
+            <a:fillRect/>
+          </a:stretch>
+        </p:blipFill>
+        <p:spPr>
+          <a:xfrm>
+            <a:off x="1298554" y="115959"/>
+            <a:ext cx="4417388" cy="3313041"/>
+          </a:xfrm>
+          <a:prstGeom prst="rect">
+            <a:avLst/>
+          </a:prstGeom>
+        </p:spPr>
+      </p:pic>
+      <p:pic>
+        <p:nvPicPr>
+          <p:cNvPr id="10" name="Picture 9">
+            <a:extLst>
+              <a:ext uri="{FF2B5EF4-FFF2-40B4-BE49-F238E27FC236}">
+                <a16:creationId xmlns:a16="http://schemas.microsoft.com/office/drawing/2014/main" id="{BE579F8C-2BAC-4758-9DD2-949030CF31E5}"/>
+              </a:ext>
+            </a:extLst>
+          </p:cNvPr>
+          <p:cNvPicPr>
+            <a:picLocks noChangeAspect="1"/>
+          </p:cNvPicPr>
+          <p:nvPr/>
+        </p:nvPicPr>
+        <p:blipFill>
+          <a:blip r:embed="rId3">
+            <a:extLst>
+              <a:ext uri="{28A0092B-C50C-407E-A947-70E740481C1C}">
+                <a14:useLocalDpi xmlns:a14="http://schemas.microsoft.com/office/drawing/2010/main" val="0"/>
+              </a:ext>
+            </a:extLst>
+          </a:blip>
+          <a:stretch>
+            <a:fillRect/>
+          </a:stretch>
+        </p:blipFill>
+        <p:spPr>
+          <a:xfrm>
+            <a:off x="6890893" y="140013"/>
+            <a:ext cx="4385316" cy="3288987"/>
+          </a:xfrm>
+          <a:prstGeom prst="rect">
+            <a:avLst/>
+          </a:prstGeom>
+        </p:spPr>
+      </p:pic>
       <p:graphicFrame>
         <p:nvGraphicFramePr>
-          <p:cNvPr id="11" name="Table 10">
-            <a:extLst>
-              <a:ext uri="{FF2B5EF4-FFF2-40B4-BE49-F238E27FC236}">
-                <a16:creationId xmlns:a16="http://schemas.microsoft.com/office/drawing/2014/main" id="{CD79C0C6-42D8-4FA3-B7BD-ED63422BE56D}"/>
+          <p:cNvPr id="2" name="Table 1">
+            <a:extLst>
+              <a:ext uri="{FF2B5EF4-FFF2-40B4-BE49-F238E27FC236}">
+                <a16:creationId xmlns:a16="http://schemas.microsoft.com/office/drawing/2014/main" id="{485349DC-C48B-4CD7-82F4-71767B3289DD}"/>
               </a:ext>
             </a:extLst>
           </p:cNvPr>
@@ -3342,14 +3554,14 @@
           <p:nvPr>
             <p:extLst>
               <p:ext uri="{D42A27DB-BD31-4B8C-83A1-F6EECF244321}">
-                <p14:modId xmlns:p14="http://schemas.microsoft.com/office/powerpoint/2010/main" val="117697861"/>
+                <p14:modId xmlns:p14="http://schemas.microsoft.com/office/powerpoint/2010/main" val="2729749846"/>
               </p:ext>
             </p:extLst>
           </p:nvPr>
         </p:nvGraphicFramePr>
         <p:xfrm>
-          <a:off x="1229692" y="4588563"/>
-          <a:ext cx="5283198" cy="762000"/>
+          <a:off x="402591" y="4608750"/>
+          <a:ext cx="6367780" cy="1199039"/>
         </p:xfrm>
         <a:graphic>
           <a:graphicData uri="http://schemas.openxmlformats.org/drawingml/2006/table">
@@ -3358,50 +3570,57 @@
                 <a:tableStyleId>{5C22544A-7EE6-4342-B048-85BDC9FD1C3A}</a:tableStyleId>
               </a:tblPr>
               <a:tblGrid>
-                <a:gridCol w="1285103">
+                <a:gridCol w="1706965">
                   <a:extLst>
                     <a:ext uri="{9D8B030D-6E8A-4147-A177-3AD203B41FA5}">
-                      <a16:colId xmlns:a16="http://schemas.microsoft.com/office/drawing/2014/main" val="2127962036"/>
+                      <a16:colId xmlns:a16="http://schemas.microsoft.com/office/drawing/2014/main" val="3669917063"/>
                     </a:ext>
                   </a:extLst>
                 </a:gridCol>
-                <a:gridCol w="799619">
+                <a:gridCol w="560098">
                   <a:extLst>
                     <a:ext uri="{9D8B030D-6E8A-4147-A177-3AD203B41FA5}">
-                      <a16:colId xmlns:a16="http://schemas.microsoft.com/office/drawing/2014/main" val="4251614792"/>
+                      <a16:colId xmlns:a16="http://schemas.microsoft.com/office/drawing/2014/main" val="922810214"/>
                     </a:ext>
                   </a:extLst>
                 </a:gridCol>
-                <a:gridCol w="799619">
+                <a:gridCol w="560098">
                   <a:extLst>
                     <a:ext uri="{9D8B030D-6E8A-4147-A177-3AD203B41FA5}">
-                      <a16:colId xmlns:a16="http://schemas.microsoft.com/office/drawing/2014/main" val="3498274672"/>
+                      <a16:colId xmlns:a16="http://schemas.microsoft.com/office/drawing/2014/main" val="1236914517"/>
                     </a:ext>
                   </a:extLst>
                 </a:gridCol>
-                <a:gridCol w="799619">
+                <a:gridCol w="560098">
                   <a:extLst>
                     <a:ext uri="{9D8B030D-6E8A-4147-A177-3AD203B41FA5}">
-                      <a16:colId xmlns:a16="http://schemas.microsoft.com/office/drawing/2014/main" val="3528402896"/>
+                      <a16:colId xmlns:a16="http://schemas.microsoft.com/office/drawing/2014/main" val="2386594467"/>
                     </a:ext>
                   </a:extLst>
                 </a:gridCol>
-                <a:gridCol w="799619">
+                <a:gridCol w="560098">
                   <a:extLst>
                     <a:ext uri="{9D8B030D-6E8A-4147-A177-3AD203B41FA5}">
-                      <a16:colId xmlns:a16="http://schemas.microsoft.com/office/drawing/2014/main" val="3254236680"/>
+                      <a16:colId xmlns:a16="http://schemas.microsoft.com/office/drawing/2014/main" val="2048522389"/>
                     </a:ext>
                   </a:extLst>
                 </a:gridCol>
-                <a:gridCol w="799619">
+                <a:gridCol w="560098">
                   <a:extLst>
                     <a:ext uri="{9D8B030D-6E8A-4147-A177-3AD203B41FA5}">
-                      <a16:colId xmlns:a16="http://schemas.microsoft.com/office/drawing/2014/main" val="949077602"/>
+                      <a16:colId xmlns:a16="http://schemas.microsoft.com/office/drawing/2014/main" val="782781697"/>
+                    </a:ext>
+                  </a:extLst>
+                </a:gridCol>
+                <a:gridCol w="1860325">
+                  <a:extLst>
+                    <a:ext uri="{9D8B030D-6E8A-4147-A177-3AD203B41FA5}">
+                      <a16:colId xmlns:a16="http://schemas.microsoft.com/office/drawing/2014/main" val="3916534992"/>
                     </a:ext>
                   </a:extLst>
                 </a:gridCol>
               </a:tblGrid>
-              <a:tr h="190500">
+              <a:tr h="214483">
                 <a:tc>
                   <a:txBody>
                     <a:bodyPr/>
@@ -3540,13 +3759,6 @@
                   </a:txBody>
                   <a:tcPr marL="9525" marR="9525" marT="9525" marB="0" anchor="b"/>
                 </a:tc>
-                <a:extLst>
-                  <a:ext uri="{0D108BD9-81ED-4DB2-BD59-A6C34878D82A}">
-                    <a16:rowId xmlns:a16="http://schemas.microsoft.com/office/drawing/2014/main" val="580267761"/>
-                  </a:ext>
-                </a:extLst>
-              </a:tr>
-              <a:tr h="190500">
                 <a:tc>
                   <a:txBody>
                     <a:bodyPr/>
@@ -3557,110 +3769,7 @@
                         <a:rPr lang="en-US" sz="1100" u="none" strike="noStrike">
                           <a:effectLst/>
                         </a:rPr>
-                        <a:t>Machine</a:t>
-                      </a:r>
-                      <a:endParaRPr lang="en-US" sz="1100" b="0" i="0" u="none" strike="noStrike">
-                        <a:solidFill>
-                          <a:srgbClr val="000000"/>
-                        </a:solidFill>
-                        <a:effectLst/>
-                        <a:latin typeface="Calibri" panose="020F0502020204030204" pitchFamily="34" charset="0"/>
-                      </a:endParaRPr>
-                    </a:p>
-                  </a:txBody>
-                  <a:tcPr marL="9525" marR="9525" marT="9525" marB="0" anchor="b"/>
-                </a:tc>
-                <a:tc>
-                  <a:txBody>
-                    <a:bodyPr/>
-                    <a:lstStyle/>
-                    <a:p>
-                      <a:pPr algn="r" fontAlgn="b"/>
-                      <a:r>
-                        <a:rPr lang="en-US" sz="1100" b="0" i="0" u="none" strike="noStrike">
-                          <a:solidFill>
-                            <a:srgbClr val="000000"/>
-                          </a:solidFill>
-                          <a:effectLst/>
-                          <a:latin typeface="Calibri" panose="020F0502020204030204" pitchFamily="34" charset="0"/>
-                        </a:rPr>
-                        <a:t>0.614457831</a:t>
-                      </a:r>
-                    </a:p>
-                  </a:txBody>
-                  <a:tcPr marL="9525" marR="9525" marT="9525" marB="0" anchor="b"/>
-                </a:tc>
-                <a:tc>
-                  <a:txBody>
-                    <a:bodyPr/>
-                    <a:lstStyle/>
-                    <a:p>
-                      <a:pPr algn="r" fontAlgn="b"/>
-                      <a:r>
-                        <a:rPr lang="en-US" sz="1100" b="0" i="0" u="none" strike="noStrike">
-                          <a:solidFill>
-                            <a:srgbClr val="000000"/>
-                          </a:solidFill>
-                          <a:effectLst/>
-                          <a:latin typeface="Calibri" panose="020F0502020204030204" pitchFamily="34" charset="0"/>
-                        </a:rPr>
-                        <a:t>0.666666667</a:t>
-                      </a:r>
-                    </a:p>
-                  </a:txBody>
-                  <a:tcPr marL="9525" marR="9525" marT="9525" marB="0" anchor="b"/>
-                </a:tc>
-                <a:tc>
-                  <a:txBody>
-                    <a:bodyPr/>
-                    <a:lstStyle/>
-                    <a:p>
-                      <a:pPr algn="r" fontAlgn="b"/>
-                      <a:r>
-                        <a:rPr lang="en-US" sz="1100" b="0" i="0" u="none" strike="noStrike" dirty="0">
-                          <a:solidFill>
-                            <a:srgbClr val="000000"/>
-                          </a:solidFill>
-                          <a:effectLst/>
-                          <a:latin typeface="Calibri" panose="020F0502020204030204" pitchFamily="34" charset="0"/>
-                        </a:rPr>
-                        <a:t>0.439024390</a:t>
-                      </a:r>
-                    </a:p>
-                  </a:txBody>
-                  <a:tcPr marL="9525" marR="9525" marT="9525" marB="0" anchor="b"/>
-                </a:tc>
-                <a:tc>
-                  <a:txBody>
-                    <a:bodyPr/>
-                    <a:lstStyle/>
-                    <a:p>
-                      <a:pPr algn="r" fontAlgn="b"/>
-                      <a:r>
-                        <a:rPr lang="en-US" sz="1100" b="0" i="0" u="none" strike="noStrike" dirty="0">
-                          <a:solidFill>
-                            <a:srgbClr val="000000"/>
-                          </a:solidFill>
-                          <a:effectLst/>
-                          <a:latin typeface="Calibri" panose="020F0502020204030204" pitchFamily="34" charset="0"/>
-                        </a:rPr>
-                        <a:t>0.681184669</a:t>
-                      </a:r>
-                    </a:p>
-                  </a:txBody>
-                  <a:tcPr marL="9525" marR="9525" marT="9525" marB="0" anchor="b"/>
-                </a:tc>
-                <a:tc>
-                  <a:txBody>
-                    <a:bodyPr/>
-                    <a:lstStyle/>
-                    <a:p>
-                      <a:pPr algn="l" fontAlgn="b"/>
-                      <a:r>
-                        <a:rPr lang="en-US" sz="1100" u="none" strike="noStrike">
-                          <a:effectLst/>
-                        </a:rPr>
-                        <a:t> </a:t>
+                        <a:t>95% CI</a:t>
                       </a:r>
                       <a:endParaRPr lang="en-US" sz="1100" b="0" i="0" u="none" strike="noStrike">
                         <a:solidFill>
@@ -3675,11 +3784,11 @@
                 </a:tc>
                 <a:extLst>
                   <a:ext uri="{0D108BD9-81ED-4DB2-BD59-A6C34878D82A}">
-                    <a16:rowId xmlns:a16="http://schemas.microsoft.com/office/drawing/2014/main" val="3456243184"/>
+                    <a16:rowId xmlns:a16="http://schemas.microsoft.com/office/drawing/2014/main" val="4072321992"/>
                   </a:ext>
                 </a:extLst>
               </a:tr>
-              <a:tr h="190500">
+              <a:tr h="214483">
                 <a:tc>
                   <a:txBody>
                     <a:bodyPr/>
@@ -3710,12 +3819,12 @@
                     <a:p>
                       <a:pPr algn="r" fontAlgn="b"/>
                       <a:r>
-                        <a:rPr lang="en-US" sz="1100" u="none" strike="noStrike">
+                        <a:rPr lang="en-US" sz="1100" u="none" strike="noStrike" dirty="0">
                           <a:effectLst/>
                         </a:rPr>
-                        <a:t>0.807228916</a:t>
+                        <a:t>0.807</a:t>
                       </a:r>
-                      <a:endParaRPr lang="en-US" sz="1100" b="0" i="0" u="none" strike="noStrike">
+                      <a:endParaRPr lang="en-US" sz="1100" b="0" i="0" u="none" strike="noStrike" dirty="0">
                         <a:solidFill>
                           <a:srgbClr val="000000"/>
                         </a:solidFill>
@@ -3736,32 +3845,9 @@
                         <a:rPr lang="en-US" sz="1100" u="none" strike="noStrike" dirty="0">
                           <a:effectLst/>
                         </a:rPr>
-                        <a:t>0.690476190</a:t>
+                        <a:t>0.690</a:t>
                       </a:r>
                       <a:endParaRPr lang="en-US" sz="1100" b="0" i="0" u="none" strike="noStrike" dirty="0">
-                        <a:solidFill>
-                          <a:srgbClr val="000000"/>
-                        </a:solidFill>
-                        <a:effectLst/>
-                        <a:latin typeface="Calibri" panose="020F0502020204030204" pitchFamily="34" charset="0"/>
-                      </a:endParaRPr>
-                    </a:p>
-                  </a:txBody>
-                  <a:tcPr marL="9525" marR="9525" marT="9525" marB="0" anchor="b"/>
-                </a:tc>
-                <a:tc>
-                  <a:txBody>
-                    <a:bodyPr/>
-                    <a:lstStyle/>
-                    <a:p>
-                      <a:pPr algn="r" fontAlgn="b"/>
-                      <a:r>
-                        <a:rPr lang="en-US" sz="1100" u="none" strike="noStrike">
-                          <a:effectLst/>
-                        </a:rPr>
-                        <a:t>0.073170732</a:t>
-                      </a:r>
-                      <a:endParaRPr lang="en-US" sz="1100" b="0" i="0" u="none" strike="noStrike">
                         <a:solidFill>
                           <a:srgbClr val="000000"/>
                         </a:solidFill>
@@ -3782,7 +3868,30 @@
                         <a:rPr lang="en-US" sz="1100" u="none" strike="noStrike" dirty="0">
                           <a:effectLst/>
                         </a:rPr>
-                        <a:t>0.808652729</a:t>
+                        <a:t>0.073</a:t>
+                      </a:r>
+                      <a:endParaRPr lang="en-US" sz="1100" b="0" i="0" u="none" strike="noStrike" dirty="0">
+                        <a:solidFill>
+                          <a:srgbClr val="000000"/>
+                        </a:solidFill>
+                        <a:effectLst/>
+                        <a:latin typeface="Calibri" panose="020F0502020204030204" pitchFamily="34" charset="0"/>
+                      </a:endParaRPr>
+                    </a:p>
+                  </a:txBody>
+                  <a:tcPr marL="9525" marR="9525" marT="9525" marB="0" anchor="b"/>
+                </a:tc>
+                <a:tc>
+                  <a:txBody>
+                    <a:bodyPr/>
+                    <a:lstStyle/>
+                    <a:p>
+                      <a:pPr algn="r" fontAlgn="b"/>
+                      <a:r>
+                        <a:rPr lang="en-US" sz="1100" u="none" strike="noStrike" dirty="0">
+                          <a:effectLst/>
+                        </a:rPr>
+                        <a:t>0.809</a:t>
                       </a:r>
                       <a:endParaRPr lang="en-US" sz="1100" b="0" i="0" u="none" strike="noStrike" dirty="0">
                         <a:solidFill>
@@ -3818,13 +3927,6 @@
                   </a:txBody>
                   <a:tcPr marL="9525" marR="9525" marT="9525" marB="0" anchor="b"/>
                 </a:tc>
-                <a:extLst>
-                  <a:ext uri="{0D108BD9-81ED-4DB2-BD59-A6C34878D82A}">
-                    <a16:rowId xmlns:a16="http://schemas.microsoft.com/office/drawing/2014/main" val="490457628"/>
-                  </a:ext>
-                </a:extLst>
-              </a:tr>
-              <a:tr h="190500">
                 <a:tc>
                   <a:txBody>
                     <a:bodyPr/>
@@ -3835,7 +3937,37 @@
                         <a:rPr lang="en-US" sz="1100" u="none" strike="noStrike">
                           <a:effectLst/>
                         </a:rPr>
-                        <a:t>Machine+Radiologist</a:t>
+                        <a:t> </a:t>
+                      </a:r>
+                      <a:endParaRPr lang="en-US" sz="1100" b="0" i="0" u="none" strike="noStrike">
+                        <a:solidFill>
+                          <a:srgbClr val="000000"/>
+                        </a:solidFill>
+                        <a:effectLst/>
+                        <a:latin typeface="Calibri" panose="020F0502020204030204" pitchFamily="34" charset="0"/>
+                      </a:endParaRPr>
+                    </a:p>
+                  </a:txBody>
+                  <a:tcPr marL="9525" marR="9525" marT="9525" marB="0" anchor="b"/>
+                </a:tc>
+                <a:extLst>
+                  <a:ext uri="{0D108BD9-81ED-4DB2-BD59-A6C34878D82A}">
+                    <a16:rowId xmlns:a16="http://schemas.microsoft.com/office/drawing/2014/main" val="4060259321"/>
+                  </a:ext>
+                </a:extLst>
+              </a:tr>
+              <a:tr h="294946">
+                <a:tc>
+                  <a:txBody>
+                    <a:bodyPr/>
+                    <a:lstStyle/>
+                    <a:p>
+                      <a:pPr algn="l" fontAlgn="b"/>
+                      <a:r>
+                        <a:rPr lang="en-US" sz="1100" u="none" strike="noStrike">
+                          <a:effectLst/>
+                        </a:rPr>
+                        <a:t>Machine</a:t>
                       </a:r>
                       <a:endParaRPr lang="en-US" sz="1100" b="0" i="0" u="none" strike="noStrike">
                         <a:solidFill>
@@ -3855,15 +3987,18 @@
                     <a:p>
                       <a:pPr algn="r" fontAlgn="b"/>
                       <a:r>
-                        <a:rPr lang="en-US" sz="1100" b="0" i="0" u="none" strike="noStrike" dirty="0">
-                          <a:solidFill>
-                            <a:srgbClr val="000000"/>
-                          </a:solidFill>
+                        <a:rPr lang="en-US" sz="1100" u="none" strike="noStrike" dirty="0">
                           <a:effectLst/>
-                          <a:latin typeface="Calibri" panose="020F0502020204030204" pitchFamily="34" charset="0"/>
                         </a:rPr>
-                        <a:t>0.855421687</a:t>
+                        <a:t>0.614</a:t>
                       </a:r>
+                      <a:endParaRPr lang="en-US" sz="1100" b="0" i="0" u="none" strike="noStrike" dirty="0">
+                        <a:solidFill>
+                          <a:srgbClr val="000000"/>
+                        </a:solidFill>
+                        <a:effectLst/>
+                        <a:latin typeface="Calibri" panose="020F0502020204030204" pitchFamily="34" charset="0"/>
+                      </a:endParaRPr>
                     </a:p>
                   </a:txBody>
                   <a:tcPr marL="9525" marR="9525" marT="9525" marB="0" anchor="b"/>
@@ -3875,15 +4010,18 @@
                     <a:p>
                       <a:pPr algn="r" fontAlgn="b"/>
                       <a:r>
-                        <a:rPr lang="en-US" sz="1100" b="0" i="0" u="none" strike="noStrike" dirty="0">
-                          <a:solidFill>
-                            <a:srgbClr val="000000"/>
-                          </a:solidFill>
+                        <a:rPr lang="en-US" sz="1100" u="none" strike="noStrike" dirty="0">
                           <a:effectLst/>
-                          <a:latin typeface="Calibri" panose="020F0502020204030204" pitchFamily="34" charset="0"/>
                         </a:rPr>
-                        <a:t>0.857142857</a:t>
+                        <a:t>0.667</a:t>
                       </a:r>
+                      <a:endParaRPr lang="en-US" sz="1100" b="0" i="0" u="none" strike="noStrike" dirty="0">
+                        <a:solidFill>
+                          <a:srgbClr val="000000"/>
+                        </a:solidFill>
+                        <a:effectLst/>
+                        <a:latin typeface="Calibri" panose="020F0502020204030204" pitchFamily="34" charset="0"/>
+                      </a:endParaRPr>
                     </a:p>
                   </a:txBody>
                   <a:tcPr marL="9525" marR="9525" marT="9525" marB="0" anchor="b"/>
@@ -3895,15 +4033,18 @@
                     <a:p>
                       <a:pPr algn="r" fontAlgn="b"/>
                       <a:r>
-                        <a:rPr lang="en-US" sz="1100" b="0" i="0" u="none" strike="noStrike" dirty="0">
-                          <a:solidFill>
-                            <a:srgbClr val="000000"/>
-                          </a:solidFill>
+                        <a:rPr lang="en-US" sz="1100" u="none" strike="noStrike" dirty="0">
                           <a:effectLst/>
-                          <a:latin typeface="Calibri" panose="020F0502020204030204" pitchFamily="34" charset="0"/>
                         </a:rPr>
-                        <a:t>0.146341463</a:t>
+                        <a:t>0.439</a:t>
                       </a:r>
+                      <a:endParaRPr lang="en-US" sz="1100" b="0" i="0" u="none" strike="noStrike" dirty="0">
+                        <a:solidFill>
+                          <a:srgbClr val="000000"/>
+                        </a:solidFill>
+                        <a:effectLst/>
+                        <a:latin typeface="Calibri" panose="020F0502020204030204" pitchFamily="34" charset="0"/>
+                      </a:endParaRPr>
                     </a:p>
                   </a:txBody>
                   <a:tcPr marL="9525" marR="9525" marT="9525" marB="0" anchor="b"/>
@@ -3915,15 +4056,18 @@
                     <a:p>
                       <a:pPr algn="r" fontAlgn="b"/>
                       <a:r>
-                        <a:rPr lang="en-US" sz="1100" b="0" i="0" u="none" strike="noStrike" dirty="0">
-                          <a:solidFill>
-                            <a:srgbClr val="000000"/>
-                          </a:solidFill>
+                        <a:rPr lang="en-US" sz="1100" u="none" strike="noStrike" dirty="0">
                           <a:effectLst/>
-                          <a:latin typeface="Calibri" panose="020F0502020204030204" pitchFamily="34" charset="0"/>
                         </a:rPr>
-                        <a:t>0.898954704</a:t>
+                        <a:t>0.681</a:t>
                       </a:r>
+                      <a:endParaRPr lang="en-US" sz="1100" b="0" i="0" u="none" strike="noStrike" dirty="0">
+                        <a:solidFill>
+                          <a:srgbClr val="000000"/>
+                        </a:solidFill>
+                        <a:effectLst/>
+                        <a:latin typeface="Calibri" panose="020F0502020204030204" pitchFamily="34" charset="0"/>
+                      </a:endParaRPr>
                     </a:p>
                   </a:txBody>
                   <a:tcPr marL="9525" marR="9525" marT="9525" marB="0" anchor="b"/>
@@ -3935,22 +4079,216 @@
                     <a:p>
                       <a:pPr algn="r" fontAlgn="b"/>
                       <a:r>
-                        <a:rPr lang="en-US" sz="1100" b="0" i="0" u="none" strike="noStrike" dirty="0">
-                          <a:solidFill>
-                            <a:srgbClr val="000000"/>
-                          </a:solidFill>
+                        <a:rPr lang="en-US" sz="1100" u="none" strike="noStrike" dirty="0">
                           <a:effectLst/>
-                          <a:latin typeface="Calibri" panose="020F0502020204030204" pitchFamily="34" charset="0"/>
                         </a:rPr>
-                        <a:t>0.035593996</a:t>
+                        <a:t>0.0597</a:t>
                       </a:r>
+                      <a:endParaRPr lang="en-US" sz="1100" b="0" i="0" u="none" strike="noStrike" dirty="0">
+                        <a:solidFill>
+                          <a:srgbClr val="000000"/>
+                        </a:solidFill>
+                        <a:effectLst/>
+                        <a:latin typeface="Calibri" panose="020F0502020204030204" pitchFamily="34" charset="0"/>
+                      </a:endParaRPr>
+                    </a:p>
+                  </a:txBody>
+                  <a:tcPr marL="9525" marR="9525" marT="9525" marB="0" anchor="b"/>
+                </a:tc>
+                <a:tc>
+                  <a:txBody>
+                    <a:bodyPr/>
+                    <a:lstStyle/>
+                    <a:p>
+                      <a:pPr algn="l" fontAlgn="b"/>
+                      <a:r>
+                        <a:rPr lang="en-US" sz="1100" u="none" strike="noStrike" dirty="0">
+                          <a:effectLst/>
+                        </a:rPr>
+                        <a:t>0.558 to 0.789</a:t>
+                      </a:r>
+                      <a:endParaRPr lang="en-US" sz="1100" b="0" i="0" u="none" strike="noStrike" dirty="0">
+                        <a:solidFill>
+                          <a:srgbClr val="000000"/>
+                        </a:solidFill>
+                        <a:effectLst/>
+                        <a:latin typeface="Calibri" panose="020F0502020204030204" pitchFamily="34" charset="0"/>
+                      </a:endParaRPr>
                     </a:p>
                   </a:txBody>
                   <a:tcPr marL="9525" marR="9525" marT="9525" marB="0" anchor="b"/>
                 </a:tc>
                 <a:extLst>
                   <a:ext uri="{0D108BD9-81ED-4DB2-BD59-A6C34878D82A}">
-                    <a16:rowId xmlns:a16="http://schemas.microsoft.com/office/drawing/2014/main" val="3546617016"/>
+                    <a16:rowId xmlns:a16="http://schemas.microsoft.com/office/drawing/2014/main" val="3702908077"/>
+                  </a:ext>
+                </a:extLst>
+              </a:tr>
+              <a:tr h="294946">
+                <a:tc>
+                  <a:txBody>
+                    <a:bodyPr/>
+                    <a:lstStyle/>
+                    <a:p>
+                      <a:pPr algn="l" fontAlgn="b"/>
+                      <a:r>
+                        <a:rPr lang="en-US" sz="1100" u="none" strike="noStrike">
+                          <a:effectLst/>
+                        </a:rPr>
+                        <a:t>Machine with radiologist gist input</a:t>
+                      </a:r>
+                      <a:endParaRPr lang="en-US" sz="1100" b="0" i="0" u="none" strike="noStrike">
+                        <a:solidFill>
+                          <a:srgbClr val="000000"/>
+                        </a:solidFill>
+                        <a:effectLst/>
+                        <a:latin typeface="Calibri" panose="020F0502020204030204" pitchFamily="34" charset="0"/>
+                      </a:endParaRPr>
+                    </a:p>
+                  </a:txBody>
+                  <a:tcPr marL="9525" marR="9525" marT="9525" marB="0" anchor="b"/>
+                </a:tc>
+                <a:tc>
+                  <a:txBody>
+                    <a:bodyPr/>
+                    <a:lstStyle/>
+                    <a:p>
+                      <a:pPr algn="r" fontAlgn="b"/>
+                      <a:r>
+                        <a:rPr lang="en-US" sz="1100" u="none" strike="noStrike" dirty="0">
+                          <a:effectLst/>
+                        </a:rPr>
+                        <a:t>0.855</a:t>
+                      </a:r>
+                      <a:endParaRPr lang="en-US" sz="1100" b="0" i="0" u="none" strike="noStrike" dirty="0">
+                        <a:solidFill>
+                          <a:srgbClr val="000000"/>
+                        </a:solidFill>
+                        <a:effectLst/>
+                        <a:latin typeface="Calibri" panose="020F0502020204030204" pitchFamily="34" charset="0"/>
+                      </a:endParaRPr>
+                    </a:p>
+                  </a:txBody>
+                  <a:tcPr marL="9525" marR="9525" marT="9525" marB="0" anchor="b"/>
+                </a:tc>
+                <a:tc>
+                  <a:txBody>
+                    <a:bodyPr/>
+                    <a:lstStyle/>
+                    <a:p>
+                      <a:pPr algn="r" fontAlgn="b"/>
+                      <a:r>
+                        <a:rPr lang="en-US" sz="1100" u="none" strike="noStrike" dirty="0">
+                          <a:effectLst/>
+                        </a:rPr>
+                        <a:t>0.857</a:t>
+                      </a:r>
+                      <a:endParaRPr lang="en-US" sz="1100" b="0" i="0" u="none" strike="noStrike" dirty="0">
+                        <a:solidFill>
+                          <a:srgbClr val="000000"/>
+                        </a:solidFill>
+                        <a:effectLst/>
+                        <a:latin typeface="Calibri" panose="020F0502020204030204" pitchFamily="34" charset="0"/>
+                      </a:endParaRPr>
+                    </a:p>
+                  </a:txBody>
+                  <a:tcPr marL="9525" marR="9525" marT="9525" marB="0" anchor="b"/>
+                </a:tc>
+                <a:tc>
+                  <a:txBody>
+                    <a:bodyPr/>
+                    <a:lstStyle/>
+                    <a:p>
+                      <a:pPr algn="r" fontAlgn="b"/>
+                      <a:r>
+                        <a:rPr lang="en-US" sz="1100" u="none" strike="noStrike" dirty="0">
+                          <a:effectLst/>
+                        </a:rPr>
+                        <a:t>0.146</a:t>
+                      </a:r>
+                      <a:endParaRPr lang="en-US" sz="1100" b="0" i="0" u="none" strike="noStrike" dirty="0">
+                        <a:solidFill>
+                          <a:srgbClr val="000000"/>
+                        </a:solidFill>
+                        <a:effectLst/>
+                        <a:latin typeface="Calibri" panose="020F0502020204030204" pitchFamily="34" charset="0"/>
+                      </a:endParaRPr>
+                    </a:p>
+                  </a:txBody>
+                  <a:tcPr marL="9525" marR="9525" marT="9525" marB="0" anchor="b"/>
+                </a:tc>
+                <a:tc>
+                  <a:txBody>
+                    <a:bodyPr/>
+                    <a:lstStyle/>
+                    <a:p>
+                      <a:pPr algn="r" fontAlgn="b"/>
+                      <a:r>
+                        <a:rPr lang="en-US" sz="1100" u="none" strike="noStrike" dirty="0">
+                          <a:effectLst/>
+                        </a:rPr>
+                        <a:t>0.899</a:t>
+                      </a:r>
+                      <a:endParaRPr lang="en-US" sz="1100" b="0" i="0" u="none" strike="noStrike" dirty="0">
+                        <a:solidFill>
+                          <a:srgbClr val="000000"/>
+                        </a:solidFill>
+                        <a:effectLst/>
+                        <a:latin typeface="Calibri" panose="020F0502020204030204" pitchFamily="34" charset="0"/>
+                      </a:endParaRPr>
+                    </a:p>
+                  </a:txBody>
+                  <a:tcPr marL="9525" marR="9525" marT="9525" marB="0" anchor="b"/>
+                </a:tc>
+                <a:tc>
+                  <a:txBody>
+                    <a:bodyPr/>
+                    <a:lstStyle/>
+                    <a:p>
+                      <a:pPr algn="r" fontAlgn="b"/>
+                      <a:r>
+                        <a:rPr lang="en-US" sz="1100" u="none" strike="noStrike" dirty="0">
+                          <a:effectLst/>
+                        </a:rPr>
+                        <a:t>0.0355</a:t>
+                      </a:r>
+                      <a:endParaRPr lang="en-US" sz="1100" b="0" i="0" u="none" strike="noStrike" dirty="0">
+                        <a:solidFill>
+                          <a:srgbClr val="000000"/>
+                        </a:solidFill>
+                        <a:effectLst/>
+                        <a:latin typeface="Calibri" panose="020F0502020204030204" pitchFamily="34" charset="0"/>
+                      </a:endParaRPr>
+                    </a:p>
+                  </a:txBody>
+                  <a:tcPr marL="9525" marR="9525" marT="9525" marB="0" anchor="b"/>
+                </a:tc>
+                <a:tc>
+                  <a:txBody>
+                    <a:bodyPr/>
+                    <a:lstStyle/>
+                    <a:p>
+                      <a:pPr algn="l" fontAlgn="b"/>
+                      <a:r>
+                        <a:rPr lang="en-US" sz="1100" u="none" strike="noStrike" dirty="0">
+                          <a:effectLst/>
+                        </a:rPr>
+                        <a:t>0.823 to 0.962</a:t>
+                      </a:r>
+                      <a:endParaRPr lang="en-US" sz="1100" b="0" i="0" u="none" strike="noStrike" dirty="0">
+                        <a:solidFill>
+                          <a:srgbClr val="000000"/>
+                        </a:solidFill>
+                        <a:effectLst/>
+                        <a:latin typeface="Calibri" panose="020F0502020204030204" pitchFamily="34" charset="0"/>
+                      </a:endParaRPr>
+                    </a:p>
+                  </a:txBody>
+                  <a:tcPr marL="9525" marR="9525" marT="9525" marB="0" anchor="b"/>
+                </a:tc>
+                <a:extLst>
+                  <a:ext uri="{0D108BD9-81ED-4DB2-BD59-A6C34878D82A}">
+                    <a16:rowId xmlns:a16="http://schemas.microsoft.com/office/drawing/2014/main" val="2456922399"/>
                   </a:ext>
                 </a:extLst>
               </a:tr>
@@ -3958,152 +4296,12 @@
           </a:graphicData>
         </a:graphic>
       </p:graphicFrame>
-      <p:sp>
-        <p:nvSpPr>
-          <p:cNvPr id="13" name="TextBox 12">
-            <a:extLst>
-              <a:ext uri="{FF2B5EF4-FFF2-40B4-BE49-F238E27FC236}">
-                <a16:creationId xmlns:a16="http://schemas.microsoft.com/office/drawing/2014/main" id="{8916050D-2EE6-4348-A01B-64238411662B}"/>
-              </a:ext>
-            </a:extLst>
-          </p:cNvPr>
-          <p:cNvSpPr txBox="1"/>
-          <p:nvPr/>
-        </p:nvSpPr>
-        <p:spPr>
-          <a:xfrm>
-            <a:off x="880720" y="209550"/>
-            <a:ext cx="352982" cy="369332"/>
-          </a:xfrm>
-          <a:prstGeom prst="rect">
-            <a:avLst/>
-          </a:prstGeom>
-          <a:noFill/>
-        </p:spPr>
-        <p:txBody>
-          <a:bodyPr wrap="none" rtlCol="0">
-            <a:spAutoFit/>
-          </a:bodyPr>
-          <a:lstStyle/>
-          <a:p>
-            <a:r>
-              <a:rPr lang="en-US" dirty="0"/>
-              <a:t>a.</a:t>
-            </a:r>
-          </a:p>
-        </p:txBody>
-      </p:sp>
-      <p:sp>
-        <p:nvSpPr>
-          <p:cNvPr id="14" name="TextBox 13">
-            <a:extLst>
-              <a:ext uri="{FF2B5EF4-FFF2-40B4-BE49-F238E27FC236}">
-                <a16:creationId xmlns:a16="http://schemas.microsoft.com/office/drawing/2014/main" id="{09B1F528-A648-4AA1-873F-43E1DB8F4D18}"/>
-              </a:ext>
-            </a:extLst>
-          </p:cNvPr>
-          <p:cNvSpPr txBox="1"/>
-          <p:nvPr/>
-        </p:nvSpPr>
-        <p:spPr>
-          <a:xfrm>
-            <a:off x="6526691" y="209550"/>
-            <a:ext cx="364202" cy="369332"/>
-          </a:xfrm>
-          <a:prstGeom prst="rect">
-            <a:avLst/>
-          </a:prstGeom>
-          <a:noFill/>
-        </p:spPr>
-        <p:txBody>
-          <a:bodyPr wrap="none" rtlCol="0">
-            <a:spAutoFit/>
-          </a:bodyPr>
-          <a:lstStyle/>
-          <a:p>
-            <a:r>
-              <a:rPr lang="en-US" dirty="0"/>
-              <a:t>b.</a:t>
-            </a:r>
-          </a:p>
-        </p:txBody>
-      </p:sp>
-      <p:sp>
-        <p:nvSpPr>
-          <p:cNvPr id="15" name="TextBox 14">
-            <a:extLst>
-              <a:ext uri="{FF2B5EF4-FFF2-40B4-BE49-F238E27FC236}">
-                <a16:creationId xmlns:a16="http://schemas.microsoft.com/office/drawing/2014/main" id="{AD499430-AD49-46AF-A29C-52E35D97A3E0}"/>
-              </a:ext>
-            </a:extLst>
-          </p:cNvPr>
-          <p:cNvSpPr txBox="1"/>
-          <p:nvPr/>
-        </p:nvSpPr>
-        <p:spPr>
-          <a:xfrm>
-            <a:off x="880720" y="3429000"/>
-            <a:ext cx="340158" cy="369332"/>
-          </a:xfrm>
-          <a:prstGeom prst="rect">
-            <a:avLst/>
-          </a:prstGeom>
-          <a:noFill/>
-        </p:spPr>
-        <p:txBody>
-          <a:bodyPr wrap="none" rtlCol="0">
-            <a:spAutoFit/>
-          </a:bodyPr>
-          <a:lstStyle/>
-          <a:p>
-            <a:r>
-              <a:rPr lang="en-US" dirty="0"/>
-              <a:t>c.</a:t>
-            </a:r>
-          </a:p>
-        </p:txBody>
-      </p:sp>
-      <p:sp>
-        <p:nvSpPr>
-          <p:cNvPr id="16" name="TextBox 15">
-            <a:extLst>
-              <a:ext uri="{FF2B5EF4-FFF2-40B4-BE49-F238E27FC236}">
-                <a16:creationId xmlns:a16="http://schemas.microsoft.com/office/drawing/2014/main" id="{492C2DB8-ED5E-4E63-8F8B-020B5442011A}"/>
-              </a:ext>
-            </a:extLst>
-          </p:cNvPr>
-          <p:cNvSpPr txBox="1"/>
-          <p:nvPr/>
-        </p:nvSpPr>
-        <p:spPr>
-          <a:xfrm>
-            <a:off x="6540907" y="3429000"/>
-            <a:ext cx="364202" cy="369332"/>
-          </a:xfrm>
-          <a:prstGeom prst="rect">
-            <a:avLst/>
-          </a:prstGeom>
-          <a:noFill/>
-        </p:spPr>
-        <p:txBody>
-          <a:bodyPr wrap="none" rtlCol="0">
-            <a:spAutoFit/>
-          </a:bodyPr>
-          <a:lstStyle/>
-          <a:p>
-            <a:r>
-              <a:rPr lang="en-US" dirty="0"/>
-              <a:t>d.</a:t>
-            </a:r>
-          </a:p>
-        </p:txBody>
-      </p:sp>
       <p:pic>
         <p:nvPicPr>
-          <p:cNvPr id="6" name="Picture 5">
-            <a:extLst>
-              <a:ext uri="{FF2B5EF4-FFF2-40B4-BE49-F238E27FC236}">
-                <a16:creationId xmlns:a16="http://schemas.microsoft.com/office/drawing/2014/main" id="{C1B83F80-FEF3-4AEC-AB6E-9485B73CC5A1}"/>
+          <p:cNvPr id="3" name="Picture 2">
+            <a:extLst>
+              <a:ext uri="{FF2B5EF4-FFF2-40B4-BE49-F238E27FC236}">
+                <a16:creationId xmlns:a16="http://schemas.microsoft.com/office/drawing/2014/main" id="{12A3A04E-1A25-491C-8CB1-C16733C6DE0B}"/>
               </a:ext>
             </a:extLst>
           </p:cNvPr>
@@ -4113,93 +4311,15 @@
           <p:nvPr/>
         </p:nvPicPr>
         <p:blipFill>
-          <a:blip r:embed="rId2">
-            <a:extLst>
-              <a:ext uri="{28A0092B-C50C-407E-A947-70E740481C1C}">
-                <a14:useLocalDpi xmlns:a14="http://schemas.microsoft.com/office/drawing/2010/main" val="0"/>
-              </a:ext>
-            </a:extLst>
-          </a:blip>
+          <a:blip r:embed="rId4"/>
           <a:stretch>
             <a:fillRect/>
           </a:stretch>
         </p:blipFill>
         <p:spPr>
           <a:xfrm>
-            <a:off x="1298554" y="115959"/>
-            <a:ext cx="4417388" cy="3313041"/>
-          </a:xfrm>
-          <a:prstGeom prst="rect">
-            <a:avLst/>
-          </a:prstGeom>
-        </p:spPr>
-      </p:pic>
-      <p:pic>
-        <p:nvPicPr>
-          <p:cNvPr id="10" name="Picture 9">
-            <a:extLst>
-              <a:ext uri="{FF2B5EF4-FFF2-40B4-BE49-F238E27FC236}">
-                <a16:creationId xmlns:a16="http://schemas.microsoft.com/office/drawing/2014/main" id="{BE579F8C-2BAC-4758-9DD2-949030CF31E5}"/>
-              </a:ext>
-            </a:extLst>
-          </p:cNvPr>
-          <p:cNvPicPr>
-            <a:picLocks noChangeAspect="1"/>
-          </p:cNvPicPr>
-          <p:nvPr/>
-        </p:nvPicPr>
-        <p:blipFill>
-          <a:blip r:embed="rId3">
-            <a:extLst>
-              <a:ext uri="{28A0092B-C50C-407E-A947-70E740481C1C}">
-                <a14:useLocalDpi xmlns:a14="http://schemas.microsoft.com/office/drawing/2010/main" val="0"/>
-              </a:ext>
-            </a:extLst>
-          </a:blip>
-          <a:stretch>
-            <a:fillRect/>
-          </a:stretch>
-        </p:blipFill>
-        <p:spPr>
-          <a:xfrm>
-            <a:off x="6890893" y="140013"/>
-            <a:ext cx="4385316" cy="3288987"/>
-          </a:xfrm>
-          <a:prstGeom prst="rect">
-            <a:avLst/>
-          </a:prstGeom>
-        </p:spPr>
-      </p:pic>
-      <p:pic>
-        <p:nvPicPr>
-          <p:cNvPr id="17" name="Picture 16">
-            <a:extLst>
-              <a:ext uri="{FF2B5EF4-FFF2-40B4-BE49-F238E27FC236}">
-                <a16:creationId xmlns:a16="http://schemas.microsoft.com/office/drawing/2014/main" id="{65E9D25D-1EC4-44D5-A295-59690F5DFD20}"/>
-              </a:ext>
-            </a:extLst>
-          </p:cNvPr>
-          <p:cNvPicPr>
-            <a:picLocks noChangeAspect="1"/>
-          </p:cNvPicPr>
-          <p:nvPr/>
-        </p:nvPicPr>
-        <p:blipFill>
-          <a:blip r:embed="rId4">
-            <a:extLst>
-              <a:ext uri="{28A0092B-C50C-407E-A947-70E740481C1C}">
-                <a14:useLocalDpi xmlns:a14="http://schemas.microsoft.com/office/drawing/2010/main" val="0"/>
-              </a:ext>
-            </a:extLst>
-          </a:blip>
-          <a:stretch>
-            <a:fillRect/>
-          </a:stretch>
-        </p:blipFill>
-        <p:spPr>
-          <a:xfrm>
-            <a:off x="6890893" y="3498537"/>
-            <a:ext cx="4385316" cy="3288987"/>
+            <a:off x="7284720" y="3958257"/>
+            <a:ext cx="3964646" cy="2325736"/>
           </a:xfrm>
           <a:prstGeom prst="rect">
             <a:avLst/>

</xml_diff>